<commit_message>
Updated code and PPT for Singleton pattern.
</commit_message>
<xml_diff>
--- a/_Doc/DesignPattern.P3.Creational(Singleton).pptx
+++ b/_Doc/DesignPattern.P3.Creational(Singleton).pptx
@@ -215,7 +215,7 @@
           <a:p>
             <a:fld id="{E18479FA-1253-41AA-8ABD-DCCC0F2E9FAF}" type="datetimeFigureOut">
               <a:rPr lang="en-US" smtClean="0"/>
-              <a:t>9/21/2015</a:t>
+              <a:t>9/22/2015</a:t>
             </a:fld>
             <a:endParaRPr lang="en-US" dirty="0"/>
           </a:p>
@@ -1129,7 +1129,7 @@
           <a:p>
             <a:fld id="{530820CF-B880-4189-942D-D702A7CBA730}" type="datetimeFigureOut">
               <a:rPr lang="zh-CN" altLang="en-US" smtClean="0"/>
-              <a:t>2015/9/21</a:t>
+              <a:t>2015/9/22</a:t>
             </a:fld>
             <a:endParaRPr lang="zh-CN" altLang="en-US"/>
           </a:p>
@@ -1294,7 +1294,7 @@
           <a:p>
             <a:fld id="{530820CF-B880-4189-942D-D702A7CBA730}" type="datetimeFigureOut">
               <a:rPr lang="zh-CN" altLang="en-US" smtClean="0"/>
-              <a:t>2015/9/21</a:t>
+              <a:t>2015/9/22</a:t>
             </a:fld>
             <a:endParaRPr lang="zh-CN" altLang="en-US"/>
           </a:p>
@@ -1469,7 +1469,7 @@
           <a:p>
             <a:fld id="{530820CF-B880-4189-942D-D702A7CBA730}" type="datetimeFigureOut">
               <a:rPr lang="zh-CN" altLang="en-US" smtClean="0"/>
-              <a:t>2015/9/21</a:t>
+              <a:t>2015/9/22</a:t>
             </a:fld>
             <a:endParaRPr lang="zh-CN" altLang="en-US"/>
           </a:p>
@@ -1634,7 +1634,7 @@
           <a:p>
             <a:fld id="{530820CF-B880-4189-942D-D702A7CBA730}" type="datetimeFigureOut">
               <a:rPr lang="zh-CN" altLang="en-US" smtClean="0"/>
-              <a:t>2015/9/21</a:t>
+              <a:t>2015/9/22</a:t>
             </a:fld>
             <a:endParaRPr lang="zh-CN" altLang="en-US"/>
           </a:p>
@@ -1875,7 +1875,7 @@
           <a:p>
             <a:fld id="{530820CF-B880-4189-942D-D702A7CBA730}" type="datetimeFigureOut">
               <a:rPr lang="zh-CN" altLang="en-US" smtClean="0"/>
-              <a:t>2015/9/21</a:t>
+              <a:t>2015/9/22</a:t>
             </a:fld>
             <a:endParaRPr lang="zh-CN" altLang="en-US"/>
           </a:p>
@@ -2158,7 +2158,7 @@
           <a:p>
             <a:fld id="{530820CF-B880-4189-942D-D702A7CBA730}" type="datetimeFigureOut">
               <a:rPr lang="zh-CN" altLang="en-US" smtClean="0"/>
-              <a:t>2015/9/21</a:t>
+              <a:t>2015/9/22</a:t>
             </a:fld>
             <a:endParaRPr lang="zh-CN" altLang="en-US"/>
           </a:p>
@@ -2575,7 +2575,7 @@
           <a:p>
             <a:fld id="{530820CF-B880-4189-942D-D702A7CBA730}" type="datetimeFigureOut">
               <a:rPr lang="zh-CN" altLang="en-US" smtClean="0"/>
-              <a:t>2015/9/21</a:t>
+              <a:t>2015/9/22</a:t>
             </a:fld>
             <a:endParaRPr lang="zh-CN" altLang="en-US"/>
           </a:p>
@@ -2688,7 +2688,7 @@
           <a:p>
             <a:fld id="{530820CF-B880-4189-942D-D702A7CBA730}" type="datetimeFigureOut">
               <a:rPr lang="zh-CN" altLang="en-US" smtClean="0"/>
-              <a:t>2015/9/21</a:t>
+              <a:t>2015/9/22</a:t>
             </a:fld>
             <a:endParaRPr lang="zh-CN" altLang="en-US"/>
           </a:p>
@@ -2778,7 +2778,7 @@
           <a:p>
             <a:fld id="{530820CF-B880-4189-942D-D702A7CBA730}" type="datetimeFigureOut">
               <a:rPr lang="zh-CN" altLang="en-US" smtClean="0"/>
-              <a:t>2015/9/21</a:t>
+              <a:t>2015/9/22</a:t>
             </a:fld>
             <a:endParaRPr lang="zh-CN" altLang="en-US"/>
           </a:p>
@@ -3050,7 +3050,7 @@
           <a:p>
             <a:fld id="{530820CF-B880-4189-942D-D702A7CBA730}" type="datetimeFigureOut">
               <a:rPr lang="zh-CN" altLang="en-US" smtClean="0"/>
-              <a:t>2015/9/21</a:t>
+              <a:t>2015/9/22</a:t>
             </a:fld>
             <a:endParaRPr lang="zh-CN" altLang="en-US"/>
           </a:p>
@@ -3298,7 +3298,7 @@
           <a:p>
             <a:fld id="{530820CF-B880-4189-942D-D702A7CBA730}" type="datetimeFigureOut">
               <a:rPr lang="zh-CN" altLang="en-US" smtClean="0"/>
-              <a:t>2015/9/21</a:t>
+              <a:t>2015/9/22</a:t>
             </a:fld>
             <a:endParaRPr lang="zh-CN" altLang="en-US"/>
           </a:p>
@@ -3506,7 +3506,7 @@
           <a:p>
             <a:fld id="{530820CF-B880-4189-942D-D702A7CBA730}" type="datetimeFigureOut">
               <a:rPr lang="zh-CN" altLang="en-US" smtClean="0"/>
-              <a:t>2015/9/21</a:t>
+              <a:t>2015/9/22</a:t>
             </a:fld>
             <a:endParaRPr lang="zh-CN" altLang="en-US"/>
           </a:p>
@@ -4638,43 +4638,7 @@
                   <a:srgbClr val="00B050"/>
                 </a:solidFill>
               </a:rPr>
-              <a:t>“</a:t>
-            </a:r>
-            <a:r>
-              <a:rPr lang="en-US" altLang="zh-CN" sz="2000" b="1" i="1" spc="50" dirty="0" smtClean="0">
-                <a:ln w="12700">
-                  <a:noFill/>
-                  <a:prstDash val="solid"/>
-                </a:ln>
-                <a:solidFill>
-                  <a:srgbClr val="00B050"/>
-                </a:solidFill>
-              </a:rPr>
-              <a:t>E</a:t>
-            </a:r>
-            <a:r>
-              <a:rPr lang="en-US" altLang="zh-CN" sz="2000" b="1" i="1" spc="50" dirty="0" smtClean="0">
-                <a:ln w="12700">
-                  <a:noFill/>
-                  <a:prstDash val="solid"/>
-                </a:ln>
-                <a:solidFill>
-                  <a:srgbClr val="00B050"/>
-                </a:solidFill>
-              </a:rPr>
-              <a:t>ager” &amp; “Lazy” </a:t>
-            </a:r>
-            <a:r>
-              <a:rPr lang="en-US" altLang="zh-CN" sz="2000" b="1" i="1" spc="50" dirty="0" smtClean="0">
-                <a:ln w="12700">
-                  <a:noFill/>
-                  <a:prstDash val="solid"/>
-                </a:ln>
-                <a:solidFill>
-                  <a:srgbClr val="00B050"/>
-                </a:solidFill>
-              </a:rPr>
-              <a:t>by C#</a:t>
+              <a:t>“Eager” &amp; “Lazy” by C#</a:t>
             </a:r>
             <a:endParaRPr lang="en-US" sz="2000" b="1" i="1" spc="50" dirty="0">
               <a:ln w="12700">
@@ -4729,22 +4693,7 @@
                 <a:ea typeface="+mj-ea"/>
                 <a:cs typeface="+mj-cs"/>
               </a:rPr>
-              <a:t>- </a:t>
-            </a:r>
-            <a:r>
-              <a:rPr lang="en-US" altLang="zh-CN" sz="1600" b="1" spc="50" dirty="0" smtClean="0">
-                <a:ln w="12700">
-                  <a:noFill/>
-                  <a:prstDash val="solid"/>
-                </a:ln>
-                <a:solidFill>
-                  <a:schemeClr val="accent4"/>
-                </a:solidFill>
-                <a:latin typeface="+mj-lt"/>
-                <a:ea typeface="+mj-ea"/>
-                <a:cs typeface="+mj-cs"/>
-              </a:rPr>
-              <a:t>Eager</a:t>
+              <a:t>- Eager</a:t>
             </a:r>
             <a:r>
               <a:rPr lang="zh-CN" altLang="en-US" sz="1600" b="1" spc="50" dirty="0" smtClean="0">
@@ -4832,22 +4781,7 @@
                 <a:ea typeface="+mj-ea"/>
                 <a:cs typeface="+mj-cs"/>
               </a:rPr>
-              <a:t>- </a:t>
-            </a:r>
-            <a:r>
-              <a:rPr lang="en-US" altLang="zh-CN" sz="1600" b="1" spc="50" dirty="0" smtClean="0">
-                <a:ln w="12700">
-                  <a:noFill/>
-                  <a:prstDash val="solid"/>
-                </a:ln>
-                <a:solidFill>
-                  <a:schemeClr val="accent4"/>
-                </a:solidFill>
-                <a:latin typeface="+mj-lt"/>
-                <a:ea typeface="+mj-ea"/>
-                <a:cs typeface="+mj-cs"/>
-              </a:rPr>
-              <a:t>C# static member</a:t>
+              <a:t>- C# static member</a:t>
             </a:r>
           </a:p>
           <a:p>
@@ -4953,22 +4887,7 @@
                 <a:ea typeface="+mj-ea"/>
                 <a:cs typeface="+mj-cs"/>
               </a:rPr>
-              <a:t>等同于</a:t>
-            </a:r>
-            <a:r>
-              <a:rPr lang="zh-CN" altLang="en-US" sz="1600" b="1" spc="50" dirty="0" smtClean="0">
-                <a:ln w="12700">
-                  <a:noFill/>
-                  <a:prstDash val="solid"/>
-                </a:ln>
-                <a:solidFill>
-                  <a:schemeClr val="accent4"/>
-                </a:solidFill>
-                <a:latin typeface="+mj-lt"/>
-                <a:ea typeface="+mj-ea"/>
-                <a:cs typeface="+mj-cs"/>
-              </a:rPr>
-              <a:t>把</a:t>
+              <a:t>等同于把</a:t>
             </a:r>
             <a:r>
               <a:rPr lang="en-US" altLang="zh-CN" sz="1200" i="1" spc="50" dirty="0">
@@ -5133,22 +5052,7 @@
                 <a:ea typeface="+mj-ea"/>
                 <a:cs typeface="+mj-cs"/>
               </a:rPr>
-              <a:t>          </a:t>
-            </a:r>
-            <a:r>
-              <a:rPr lang="en-US" altLang="zh-CN" sz="1600" b="1" spc="50" dirty="0" smtClean="0">
-                <a:ln w="12700">
-                  <a:noFill/>
-                  <a:prstDash val="solid"/>
-                </a:ln>
-                <a:solidFill>
-                  <a:schemeClr val="accent4"/>
-                </a:solidFill>
-                <a:latin typeface="+mj-lt"/>
-                <a:ea typeface="+mj-ea"/>
-                <a:cs typeface="+mj-cs"/>
-              </a:rPr>
-              <a:t>a. </a:t>
+              <a:t>          a. </a:t>
             </a:r>
             <a:r>
               <a:rPr lang="zh-CN" altLang="en-US" sz="1600" b="1" spc="50" dirty="0" smtClean="0">
@@ -5192,10 +5096,10 @@
                 <a:ea typeface="+mj-ea"/>
                 <a:cs typeface="+mj-cs"/>
               </a:rPr>
-              <a:t>	</a:t>
-            </a:r>
-            <a:r>
-              <a:rPr lang="en-US" altLang="zh-CN" sz="1600" b="1" spc="50" dirty="0">
+              <a:t>	 </a:t>
+            </a:r>
+            <a:r>
+              <a:rPr lang="en-US" altLang="zh-CN" sz="1600" b="1" spc="50" dirty="0" smtClean="0">
                 <a:ln w="12700">
                   <a:noFill/>
                   <a:prstDash val="solid"/>
@@ -5207,37 +5111,7 @@
                 <a:ea typeface="+mj-ea"/>
                 <a:cs typeface="+mj-cs"/>
               </a:rPr>
-              <a:t> </a:t>
-            </a:r>
-            <a:r>
-              <a:rPr lang="en-US" altLang="zh-CN" sz="1600" b="1" spc="50" dirty="0" smtClean="0">
-                <a:ln w="12700">
-                  <a:noFill/>
-                  <a:prstDash val="solid"/>
-                </a:ln>
-                <a:solidFill>
-                  <a:schemeClr val="accent4"/>
-                </a:solidFill>
-                <a:latin typeface="+mj-lt"/>
-                <a:ea typeface="+mj-ea"/>
-                <a:cs typeface="+mj-cs"/>
-              </a:rPr>
-              <a:t>         </a:t>
-            </a:r>
-            <a:r>
-              <a:rPr lang="en-US" altLang="zh-CN" sz="1600" b="1" spc="50" dirty="0" smtClean="0">
-                <a:ln w="12700">
-                  <a:noFill/>
-                  <a:prstDash val="solid"/>
-                </a:ln>
-                <a:solidFill>
-                  <a:schemeClr val="accent4"/>
-                </a:solidFill>
-                <a:latin typeface="+mj-lt"/>
-                <a:ea typeface="+mj-ea"/>
-                <a:cs typeface="+mj-cs"/>
-              </a:rPr>
-              <a:t>b. </a:t>
+              <a:t>         b. </a:t>
             </a:r>
             <a:r>
               <a:rPr lang="zh-CN" altLang="en-US" sz="1600" b="1" spc="50" dirty="0" smtClean="0">
@@ -5385,10 +5259,10 @@
                 <a:ea typeface="+mj-ea"/>
                 <a:cs typeface="+mj-cs"/>
               </a:rPr>
-              <a:t>	</a:t>
-            </a:r>
-            <a:r>
-              <a:rPr lang="en-US" altLang="zh-CN" sz="1600" b="1" spc="50" dirty="0">
+              <a:t>	 </a:t>
+            </a:r>
+            <a:r>
+              <a:rPr lang="en-US" altLang="zh-CN" sz="1600" b="1" spc="50" dirty="0" smtClean="0">
                 <a:ln w="12700">
                   <a:noFill/>
                   <a:prstDash val="solid"/>
@@ -5400,52 +5274,7 @@
                 <a:ea typeface="+mj-ea"/>
                 <a:cs typeface="+mj-cs"/>
               </a:rPr>
-              <a:t> </a:t>
-            </a:r>
-            <a:r>
-              <a:rPr lang="en-US" altLang="zh-CN" sz="1600" b="1" spc="50" dirty="0" smtClean="0">
-                <a:ln w="12700">
-                  <a:noFill/>
-                  <a:prstDash val="solid"/>
-                </a:ln>
-                <a:solidFill>
-                  <a:schemeClr val="accent4"/>
-                </a:solidFill>
-                <a:latin typeface="+mj-lt"/>
-                <a:ea typeface="+mj-ea"/>
-                <a:cs typeface="+mj-cs"/>
-              </a:rPr>
-              <a:t>                  </a:t>
-            </a:r>
-            <a:r>
-              <a:rPr lang="en-US" altLang="zh-CN" sz="1600" b="1" spc="50" dirty="0" smtClean="0">
-                <a:ln w="12700">
-                  <a:noFill/>
-                  <a:prstDash val="solid"/>
-                </a:ln>
-                <a:solidFill>
-                  <a:schemeClr val="accent4"/>
-                </a:solidFill>
-                <a:latin typeface="+mj-lt"/>
-                <a:ea typeface="+mj-ea"/>
-                <a:cs typeface="+mj-cs"/>
-              </a:rPr>
-              <a:t>Constant members </a:t>
-            </a:r>
-            <a:r>
-              <a:rPr lang="en-US" altLang="zh-CN" sz="1600" b="1" spc="50" dirty="0" smtClean="0">
-                <a:ln w="12700">
-                  <a:noFill/>
-                  <a:prstDash val="solid"/>
-                </a:ln>
-                <a:solidFill>
-                  <a:schemeClr val="accent4"/>
-                </a:solidFill>
-                <a:latin typeface="+mj-lt"/>
-                <a:ea typeface="+mj-ea"/>
-                <a:cs typeface="+mj-cs"/>
-              </a:rPr>
-              <a:t>	</a:t>
+              <a:t>                  Constant members 	</a:t>
             </a:r>
             <a:r>
               <a:rPr lang="en-US" altLang="zh-CN" sz="1200" i="1" spc="50" dirty="0" smtClean="0">
@@ -5686,22 +5515,7 @@
                 <a:ea typeface="+mj-ea"/>
                 <a:cs typeface="+mj-cs"/>
               </a:rPr>
-              <a:t>	</a:t>
-            </a:r>
-            <a:r>
-              <a:rPr lang="en-US" altLang="zh-CN" sz="1600" b="1" spc="50" dirty="0">
-                <a:ln w="12700">
-                  <a:noFill/>
-                  <a:prstDash val="solid"/>
-                </a:ln>
-                <a:solidFill>
-                  <a:schemeClr val="accent4"/>
-                </a:solidFill>
-                <a:latin typeface="+mj-lt"/>
-                <a:ea typeface="+mj-ea"/>
-                <a:cs typeface="+mj-cs"/>
-              </a:rPr>
-              <a:t>          </a:t>
+              <a:t>	          </a:t>
             </a:r>
             <a:r>
               <a:rPr lang="en-US" altLang="zh-CN" sz="1600" b="1" spc="50" dirty="0" smtClean="0">
@@ -5760,10 +5574,10 @@
                 <a:ea typeface="+mj-ea"/>
                 <a:cs typeface="+mj-cs"/>
               </a:rPr>
-              <a:t> </a:t>
-            </a:r>
-            <a:r>
-              <a:rPr lang="en-US" altLang="zh-CN" sz="1600" b="1" spc="50" dirty="0">
+              <a:t>                            </a:t>
+            </a:r>
+            <a:r>
+              <a:rPr lang="en-US" altLang="zh-CN" sz="1600" b="1" spc="50" dirty="0" smtClean="0">
                 <a:ln w="12700">
                   <a:noFill/>
                   <a:prstDash val="solid"/>
@@ -5775,10 +5589,10 @@
                 <a:ea typeface="+mj-ea"/>
                 <a:cs typeface="+mj-cs"/>
               </a:rPr>
-              <a:t>                           </a:t>
-            </a:r>
-            <a:r>
-              <a:rPr lang="en-US" altLang="zh-CN" sz="1600" b="1" spc="50" dirty="0" smtClean="0">
+              <a:t>Eager</a:t>
+            </a:r>
+            <a:r>
+              <a:rPr lang="en-US" altLang="zh-CN" sz="1600" b="1" spc="50" dirty="0">
                 <a:ln w="12700">
                   <a:noFill/>
                   <a:prstDash val="solid"/>
@@ -5790,10 +5604,10 @@
                 <a:ea typeface="+mj-ea"/>
                 <a:cs typeface="+mj-cs"/>
               </a:rPr>
-              <a:t>Eager</a:t>
-            </a:r>
-            <a:r>
-              <a:rPr lang="en-US" altLang="zh-CN" sz="1600" b="1" spc="50" dirty="0">
+              <a:t>:</a:t>
+            </a:r>
+            <a:r>
+              <a:rPr lang="en-US" altLang="zh-CN" sz="1600" b="1" spc="50" dirty="0" smtClean="0">
                 <a:ln w="12700">
                   <a:noFill/>
                   <a:prstDash val="solid"/>
@@ -5805,37 +5619,7 @@
                 <a:ea typeface="+mj-ea"/>
                 <a:cs typeface="+mj-cs"/>
               </a:rPr>
-              <a:t>:</a:t>
-            </a:r>
-            <a:r>
-              <a:rPr lang="en-US" altLang="zh-CN" sz="1600" b="1" spc="50" dirty="0" smtClean="0">
-                <a:ln w="12700">
-                  <a:noFill/>
-                  <a:prstDash val="solid"/>
-                </a:ln>
-                <a:solidFill>
-                  <a:schemeClr val="accent4"/>
-                </a:solidFill>
-                <a:latin typeface="+mj-lt"/>
-                <a:ea typeface="+mj-ea"/>
-                <a:cs typeface="+mj-cs"/>
-              </a:rPr>
-              <a:t>        </a:t>
-            </a:r>
-            <a:r>
-              <a:rPr lang="en-US" altLang="zh-CN" sz="1600" b="1" spc="50" dirty="0" smtClean="0">
-                <a:ln w="12700">
-                  <a:noFill/>
-                  <a:prstDash val="solid"/>
-                </a:ln>
-                <a:solidFill>
-                  <a:schemeClr val="accent4"/>
-                </a:solidFill>
-                <a:latin typeface="+mj-lt"/>
-                <a:ea typeface="+mj-ea"/>
-                <a:cs typeface="+mj-cs"/>
-              </a:rPr>
-              <a:t>Static constructor</a:t>
+              <a:t>        Static constructor</a:t>
             </a:r>
             <a:br>
               <a:rPr lang="en-US" altLang="zh-CN" sz="1600" b="1" spc="50" dirty="0" smtClean="0">
@@ -5895,6 +5679,38 @@
               </a:rPr>
               <a:t>- Thread Safety</a:t>
             </a:r>
+          </a:p>
+          <a:p>
+            <a:r>
+              <a:rPr lang="en-US" altLang="zh-CN" sz="1600" b="1" spc="50" dirty="0" smtClean="0">
+                <a:ln w="12700">
+                  <a:noFill/>
+                  <a:prstDash val="solid"/>
+                </a:ln>
+                <a:solidFill>
+                  <a:schemeClr val="accent4"/>
+                </a:solidFill>
+                <a:latin typeface="+mj-lt"/>
+                <a:ea typeface="+mj-ea"/>
+                <a:cs typeface="+mj-cs"/>
+              </a:rPr>
+              <a:t>	          Lazy:          </a:t>
+            </a:r>
+            <a:r>
+              <a:rPr lang="zh-CN" altLang="en-US" sz="1600" b="1" spc="50" dirty="0" smtClean="0">
+                <a:ln w="12700">
+                  <a:noFill/>
+                  <a:prstDash val="solid"/>
+                </a:ln>
+                <a:solidFill>
+                  <a:schemeClr val="accent4"/>
+                </a:solidFill>
+                <a:latin typeface="+mj-lt"/>
+                <a:ea typeface="+mj-ea"/>
+                <a:cs typeface="+mj-cs"/>
+              </a:rPr>
+              <a:t>需要自己实现同步机制</a:t>
+            </a:r>
             <a:endParaRPr lang="en-US" altLang="zh-CN" sz="1600" b="1" spc="50" dirty="0" smtClean="0">
               <a:ln w="12700">
                 <a:noFill/>
@@ -5910,7 +5726,7 @@
           </a:p>
           <a:p>
             <a:r>
-              <a:rPr lang="en-US" altLang="zh-CN" sz="1600" b="1" spc="50" dirty="0" smtClean="0">
+              <a:rPr lang="en-US" altLang="zh-CN" sz="1600" b="1" spc="50" dirty="0">
                 <a:ln w="12700">
                   <a:noFill/>
                   <a:prstDash val="solid"/>
@@ -5922,7 +5738,7 @@
                 <a:ea typeface="+mj-ea"/>
                 <a:cs typeface="+mj-cs"/>
               </a:rPr>
-              <a:t>	          Lazy</a:t>
+              <a:t>	</a:t>
             </a:r>
             <a:r>
               <a:rPr lang="en-US" altLang="zh-CN" sz="1600" b="1" spc="50" dirty="0" smtClean="0">
@@ -5937,7 +5753,7 @@
                 <a:ea typeface="+mj-ea"/>
                 <a:cs typeface="+mj-cs"/>
               </a:rPr>
-              <a:t>:          </a:t>
+              <a:t>          Eager:        .Net</a:t>
             </a:r>
             <a:r>
               <a:rPr lang="zh-CN" altLang="en-US" sz="1600" b="1" spc="50" dirty="0" smtClean="0">
@@ -5952,81 +5768,7 @@
                 <a:ea typeface="+mj-ea"/>
                 <a:cs typeface="+mj-cs"/>
               </a:rPr>
-              <a:t>需要自己实现同步机制</a:t>
-            </a:r>
-            <a:endParaRPr lang="en-US" altLang="zh-CN" sz="1600" b="1" spc="50" dirty="0" smtClean="0">
-              <a:ln w="12700">
-                <a:noFill/>
-                <a:prstDash val="solid"/>
-              </a:ln>
-              <a:solidFill>
-                <a:schemeClr val="accent4"/>
-              </a:solidFill>
-              <a:latin typeface="+mj-lt"/>
-              <a:ea typeface="+mj-ea"/>
-              <a:cs typeface="+mj-cs"/>
-            </a:endParaRPr>
-          </a:p>
-          <a:p>
-            <a:r>
-              <a:rPr lang="en-US" altLang="zh-CN" sz="1600" b="1" spc="50" dirty="0">
-                <a:ln w="12700">
-                  <a:noFill/>
-                  <a:prstDash val="solid"/>
-                </a:ln>
-                <a:solidFill>
-                  <a:schemeClr val="accent4"/>
-                </a:solidFill>
-                <a:latin typeface="+mj-lt"/>
-                <a:ea typeface="+mj-ea"/>
-                <a:cs typeface="+mj-cs"/>
-              </a:rPr>
-              <a:t>	</a:t>
-            </a:r>
-            <a:r>
-              <a:rPr lang="en-US" altLang="zh-CN" sz="1600" b="1" spc="50" dirty="0" smtClean="0">
-                <a:ln w="12700">
-                  <a:noFill/>
-                  <a:prstDash val="solid"/>
-                </a:ln>
-                <a:solidFill>
-                  <a:schemeClr val="accent4"/>
-                </a:solidFill>
-                <a:latin typeface="+mj-lt"/>
-                <a:ea typeface="+mj-ea"/>
-                <a:cs typeface="+mj-cs"/>
-              </a:rPr>
-              <a:t>          Eager:        .Net</a:t>
-            </a:r>
-            <a:r>
-              <a:rPr lang="zh-CN" altLang="en-US" sz="1600" b="1" spc="50" dirty="0" smtClean="0">
-                <a:ln w="12700">
-                  <a:noFill/>
-                  <a:prstDash val="solid"/>
-                </a:ln>
-                <a:solidFill>
-                  <a:schemeClr val="accent4"/>
-                </a:solidFill>
-                <a:latin typeface="+mj-lt"/>
-                <a:ea typeface="+mj-ea"/>
-                <a:cs typeface="+mj-cs"/>
-              </a:rPr>
-              <a:t>内部</a:t>
-            </a:r>
-            <a:r>
-              <a:rPr lang="zh-CN" altLang="en-US" sz="1600" b="1" spc="50" dirty="0" smtClean="0">
-                <a:ln w="12700">
-                  <a:noFill/>
-                  <a:prstDash val="solid"/>
-                </a:ln>
-                <a:solidFill>
-                  <a:schemeClr val="accent4"/>
-                </a:solidFill>
-                <a:latin typeface="+mj-lt"/>
-                <a:ea typeface="+mj-ea"/>
-                <a:cs typeface="+mj-cs"/>
-              </a:rPr>
-              <a:t>机制保障（简单高效）</a:t>
+              <a:t>内部机制保障（简单高效）</a:t>
             </a:r>
             <a:endParaRPr lang="en-US" altLang="zh-CN" sz="1600" b="1" spc="50" dirty="0" smtClean="0">
               <a:ln w="12700">
@@ -6202,13 +5944,7 @@
               <a:rPr lang="zh-CN" altLang="en-US" sz="2700" b="1" dirty="0" smtClean="0">
                 <a:effectLst/>
               </a:rPr>
-              <a:t>需求</a:t>
-            </a:r>
-            <a:r>
-              <a:rPr lang="zh-CN" altLang="en-US" sz="2700" b="1" dirty="0" smtClean="0">
-                <a:effectLst/>
-              </a:rPr>
-              <a:t>：</a:t>
+              <a:t>需求：</a:t>
             </a:r>
             <a:endParaRPr lang="en-US" altLang="zh-CN" sz="2700" b="1" dirty="0" smtClean="0">
               <a:effectLst/>
@@ -7287,7 +7023,7 @@
         </p:spPr>
         <p:txBody>
           <a:bodyPr vert="horz" rtlCol="0" anchor="ctr">
-            <a:normAutofit/>
+            <a:normAutofit lnSpcReduction="10000"/>
             <a:scene3d>
               <a:camera prst="orthographicFront"/>
               <a:lightRig rig="soft" dir="t"/>
@@ -7485,7 +7221,13 @@
               <a:rPr lang="en-US" altLang="zh-CN" sz="1200" b="1" dirty="0" smtClean="0">
                 <a:effectLst/>
               </a:rPr>
-              <a:t>Derived classes’ instances are ALL created unnecessarily</a:t>
+              <a:t>Derived classes’ instances are ALL created </a:t>
+            </a:r>
+            <a:r>
+              <a:rPr lang="en-US" altLang="zh-CN" sz="1200" b="1" dirty="0" smtClean="0">
+                <a:effectLst/>
+              </a:rPr>
+              <a:t>at the same time, even some of them will never been used</a:t>
             </a:r>
             <a:endParaRPr lang="en-US" altLang="zh-CN" sz="1200" b="1" dirty="0">
               <a:effectLst/>
@@ -8454,7 +8196,7 @@
       </p:sp>
       <p:pic>
         <p:nvPicPr>
-          <p:cNvPr id="4099" name="Picture 3"/>
+          <p:cNvPr id="1026" name="Picture 2"/>
           <p:cNvPicPr>
             <a:picLocks noChangeAspect="1" noChangeArrowheads="1"/>
           </p:cNvPicPr>
@@ -8475,8 +8217,8 @@
         </p:blipFill>
         <p:spPr bwMode="auto">
           <a:xfrm>
-            <a:off x="1238250" y="1596355"/>
-            <a:ext cx="6667500" cy="4352925"/>
+            <a:off x="1200150" y="1628800"/>
+            <a:ext cx="6743700" cy="4352925"/>
           </a:xfrm>
           <a:prstGeom prst="rect">
             <a:avLst/>
@@ -11073,15 +10815,7 @@
                   <a:schemeClr val="accent4"/>
                 </a:solidFill>
               </a:rPr>
-              <a:t>Abstract Factory - Concrete </a:t>
-            </a:r>
-            <a:r>
-              <a:rPr lang="en-US" altLang="zh-CN" sz="1400" dirty="0" smtClean="0">
-                <a:solidFill>
-                  <a:schemeClr val="accent4"/>
-                </a:solidFill>
-              </a:rPr>
-              <a:t>Factory</a:t>
+              <a:t>Abstract Factory - Concrete Factory</a:t>
             </a:r>
           </a:p>
           <a:p>
@@ -11100,11 +10834,6 @@
               </a:rPr>
               <a:t>	Builder</a:t>
             </a:r>
-            <a:endParaRPr lang="en-US" altLang="zh-CN" sz="1400" dirty="0" smtClean="0">
-              <a:solidFill>
-                <a:schemeClr val="accent4"/>
-              </a:solidFill>
-            </a:endParaRPr>
           </a:p>
           <a:p>
             <a:endParaRPr lang="en-US" altLang="zh-CN" sz="1400" dirty="0">

</xml_diff>